<commit_message>
Web Success - Commented GitLatch Commit @ 2022-12-28-8-54-19-241
</commit_message>
<xml_diff>
--- a/WebPPT.pptx
+++ b/WebPPT.pptx
@@ -119,7 +119,8 @@
 <file path=ppt/revisionInfo.xml><?xml version="1.0" encoding="utf-8"?>
 <p1510:revInfo xmlns:a="http://schemas.openxmlformats.org/drawingml/2006/main" xmlns:r="http://schemas.openxmlformats.org/officeDocument/2006/relationships" xmlns:p1510="http://schemas.microsoft.com/office/powerpoint/2015/10/main">
   <p1510:revLst>
-    <p1510:client id="{5A130050-35DF-4B4B-9425-060D07BAAEBA}" v="42" dt="2022-12-28T08:51:59.777"/>
+    <p1510:client id="{5A130050-35DF-4B4B-9425-060D07BAAEBA}" v="41" dt="2022-12-28T08:50:58.088"/>
+    <p1510:client id="{728F87C0-4FA7-BB55-3AE8-4B0DEBD850B3}" v="15" dt="2022-12-28T08:53:38.668"/>
   </p1510:revLst>
 </p1510:revInfo>
 </file>
@@ -129,7 +130,7 @@
   <pc:docChgLst>
     <pc:chgData name="TEST_TEST_SPOProvHeartbeat_E3_15_2211262300_10567" userId="S::admin@a830edad9050849567e22112623.onmicrosoft.com::a9ee3c03-47fc-4e1e-8a5c-e6c67826edf5" providerId="AD" clId="Web-{5A130050-35DF-4B4B-9425-060D07BAAEBA}"/>
     <pc:docChg chg="addSld modSld replTag">
-      <pc:chgData name="TEST_TEST_SPOProvHeartbeat_E3_15_2211262300_10567" userId="S::admin@a830edad9050849567e22112623.onmicrosoft.com::a9ee3c03-47fc-4e1e-8a5c-e6c67826edf5" providerId="AD" clId="Web-{5A130050-35DF-4B4B-9425-060D07BAAEBA}" dt="2022-12-28T08:51:59.777" v="38"/>
+      <pc:chgData name="TEST_TEST_SPOProvHeartbeat_E3_15_2211262300_10567" userId="S::admin@a830edad9050849567e22112623.onmicrosoft.com::a9ee3c03-47fc-4e1e-8a5c-e6c67826edf5" providerId="AD" clId="Web-{5A130050-35DF-4B4B-9425-060D07BAAEBA}" dt="2022-12-28T08:50:58.088" v="37"/>
       <pc:docMkLst>
         <pc:docMk/>
       </pc:docMkLst>
@@ -163,6 +164,15 @@
           </ac:spMkLst>
         </pc:spChg>
       </pc:sldChg>
+    </pc:docChg>
+  </pc:docChgLst>
+  <pc:docChgLst>
+    <pc:chgData name="TEST_TEST_SPOProvHeartbeat_E3_15_2211262300_10567" userId="S::admin@a830edad9050849567e22112623.onmicrosoft.com::a9ee3c03-47fc-4e1e-8a5c-e6c67826edf5" providerId="AD" clId="Web-{728F87C0-4FA7-BB55-3AE8-4B0DEBD850B3}"/>
+    <pc:docChg chg="replTag">
+      <pc:chgData name="TEST_TEST_SPOProvHeartbeat_E3_15_2211262300_10567" userId="S::admin@a830edad9050849567e22112623.onmicrosoft.com::a9ee3c03-47fc-4e1e-8a5c-e6c67826edf5" providerId="AD" clId="Web-{728F87C0-4FA7-BB55-3AE8-4B0DEBD850B3}" dt="2022-12-28T08:53:38.668" v="14"/>
+      <pc:docMkLst>
+        <pc:docMk/>
+      </pc:docMkLst>
     </pc:docChg>
   </pc:docChgLst>
 </pc:chgInfo>
@@ -3182,11 +3192,11 @@
 
 <file path=ppt/tags/tag1.xml><?xml version="1.0" encoding="utf-8"?>
 <p:tagLst xmlns:a="http://schemas.openxmlformats.org/drawingml/2006/main" xmlns:r="http://schemas.openxmlformats.org/officeDocument/2006/relationships" xmlns:p="http://schemas.openxmlformats.org/presentationml/2006/main">
+  <p:tag name="GITLATCHSETTINGSCP.OWNERNAME" val="Test1135"/>
   <p:tag name="GITLATCHSETTINGSCP.REPONAME" val="testaddin"/>
   <p:tag name="GITLATCHSETTINGSCP.BRANCH" val="gitlatch"/>
   <p:tag name="GITLATCHSETTINGSCP.FILENAME" val="WebPPT"/>
   <p:tag name="GITLATCHSETTINGSCP.AUTOSHOW" val="YES"/>
-  <p:tag name="GITLATCHSETTINGSCP.OWNERNAME" val="Test1135"/>
 </p:tagLst>
 </file>
 

</xml_diff>